<commit_message>
Se hacen modificaciones en archivo R, obteniendo nuevos archivos complementarios.
</commit_message>
<xml_diff>
--- a/Financial_Risk.pptx
+++ b/Financial_Risk.pptx
@@ -9,7 +9,9 @@
     <p:sldId id="257" r:id="rId3"/>
     <p:sldId id="260" r:id="rId4"/>
     <p:sldId id="258" r:id="rId5"/>
-    <p:sldId id="259" r:id="rId6"/>
+    <p:sldId id="261" r:id="rId6"/>
+    <p:sldId id="259" r:id="rId7"/>
+    <p:sldId id="262" r:id="rId8"/>
   </p:sldIdLst>
   <p:sldSz cx="12192000" cy="6858000"/>
   <p:notesSz cx="6858000" cy="9144000"/>
@@ -108,6 +110,11 @@
       </a:defRPr>
     </a:lvl9pPr>
   </p:defaultTextStyle>
+  <p:extLst>
+    <p:ext uri="{EFAFB233-063F-42B5-8137-9DF3F51BA10A}">
+      <p15:sldGuideLst xmlns:p15="http://schemas.microsoft.com/office/powerpoint/2012/main"/>
+    </p:ext>
+  </p:extLst>
 </p:presentation>
 </file>
 
@@ -161,7 +168,7 @@
           <a:noFill/>
           <a:extLst>
             <a:ext uri="{909E8E84-426E-40dd-AFC4-6F175D3DCCD1}">
-              <a14:hiddenFill xmlns:a14="http://schemas.microsoft.com/office/drawing/2010/main" xmlns="">
+              <a14:hiddenFill xmlns="" xmlns:a14="http://schemas.microsoft.com/office/drawing/2010/main">
                 <a:solidFill>
                   <a:srgbClr val="FFFFFF"/>
                 </a:solidFill>
@@ -221,7 +228,7 @@
             </a:ln>
             <a:extLst>
               <a:ext uri="{91240B29-F687-4f45-9708-019B960494DF}">
-                <a14:hiddenLine xmlns:a14="http://schemas.microsoft.com/office/drawing/2010/main" xmlns="" w="9525">
+                <a14:hiddenLine xmlns="" xmlns:a14="http://schemas.microsoft.com/office/drawing/2010/main" w="9525">
                   <a:solidFill>
                     <a:srgbClr val="000000"/>
                   </a:solidFill>
@@ -311,7 +318,7 @@
             </a:ln>
             <a:extLst>
               <a:ext uri="{91240B29-F687-4f45-9708-019B960494DF}">
-                <a14:hiddenLine xmlns:a14="http://schemas.microsoft.com/office/drawing/2010/main" xmlns="" w="9525">
+                <a14:hiddenLine xmlns="" xmlns:a14="http://schemas.microsoft.com/office/drawing/2010/main" w="9525">
                   <a:solidFill>
                     <a:srgbClr val="000000"/>
                   </a:solidFill>
@@ -401,7 +408,7 @@
             </a:ln>
             <a:extLst>
               <a:ext uri="{91240B29-F687-4f45-9708-019B960494DF}">
-                <a14:hiddenLine xmlns:a14="http://schemas.microsoft.com/office/drawing/2010/main" xmlns="" w="9525">
+                <a14:hiddenLine xmlns="" xmlns:a14="http://schemas.microsoft.com/office/drawing/2010/main" w="9525">
                   <a:solidFill>
                     <a:srgbClr val="000000"/>
                   </a:solidFill>
@@ -435,7 +442,7 @@
             </a:ln>
             <a:extLst>
               <a:ext uri="{91240B29-F687-4f45-9708-019B960494DF}">
-                <a14:hiddenLine xmlns:a14="http://schemas.microsoft.com/office/drawing/2010/main" xmlns="" w="9525">
+                <a14:hiddenLine xmlns="" xmlns:a14="http://schemas.microsoft.com/office/drawing/2010/main" w="9525">
                   <a:solidFill>
                     <a:srgbClr val="000000"/>
                   </a:solidFill>
@@ -525,7 +532,7 @@
             </a:ln>
             <a:extLst>
               <a:ext uri="{91240B29-F687-4f45-9708-019B960494DF}">
-                <a14:hiddenLine xmlns:a14="http://schemas.microsoft.com/office/drawing/2010/main" xmlns="" w="9525">
+                <a14:hiddenLine xmlns="" xmlns:a14="http://schemas.microsoft.com/office/drawing/2010/main" w="9525">
                   <a:solidFill>
                     <a:srgbClr val="000000"/>
                   </a:solidFill>
@@ -587,7 +594,7 @@
             </a:ln>
             <a:extLst>
               <a:ext uri="{91240B29-F687-4f45-9708-019B960494DF}">
-                <a14:hiddenLine xmlns:a14="http://schemas.microsoft.com/office/drawing/2010/main" xmlns="" w="9525">
+                <a14:hiddenLine xmlns="" xmlns:a14="http://schemas.microsoft.com/office/drawing/2010/main" w="9525">
                   <a:solidFill>
                     <a:srgbClr val="000000"/>
                   </a:solidFill>
@@ -649,7 +656,7 @@
             </a:ln>
             <a:extLst>
               <a:ext uri="{91240B29-F687-4f45-9708-019B960494DF}">
-                <a14:hiddenLine xmlns:a14="http://schemas.microsoft.com/office/drawing/2010/main" xmlns="" w="9525">
+                <a14:hiddenLine xmlns="" xmlns:a14="http://schemas.microsoft.com/office/drawing/2010/main" w="9525">
                   <a:solidFill>
                     <a:srgbClr val="000000"/>
                   </a:solidFill>
@@ -739,7 +746,7 @@
             </a:ln>
             <a:extLst>
               <a:ext uri="{91240B29-F687-4f45-9708-019B960494DF}">
-                <a14:hiddenLine xmlns:a14="http://schemas.microsoft.com/office/drawing/2010/main" xmlns="" w="9525">
+                <a14:hiddenLine xmlns="" xmlns:a14="http://schemas.microsoft.com/office/drawing/2010/main" w="9525">
                   <a:solidFill>
                     <a:srgbClr val="000000"/>
                   </a:solidFill>
@@ -801,7 +808,7 @@
             </a:ln>
             <a:extLst>
               <a:ext uri="{91240B29-F687-4f45-9708-019B960494DF}">
-                <a14:hiddenLine xmlns:a14="http://schemas.microsoft.com/office/drawing/2010/main" xmlns="" w="9525">
+                <a14:hiddenLine xmlns="" xmlns:a14="http://schemas.microsoft.com/office/drawing/2010/main" w="9525">
                   <a:solidFill>
                     <a:srgbClr val="000000"/>
                   </a:solidFill>
@@ -863,7 +870,7 @@
             </a:ln>
             <a:extLst>
               <a:ext uri="{91240B29-F687-4f45-9708-019B960494DF}">
-                <a14:hiddenLine xmlns:a14="http://schemas.microsoft.com/office/drawing/2010/main" xmlns="" w="9525">
+                <a14:hiddenLine xmlns="" xmlns:a14="http://schemas.microsoft.com/office/drawing/2010/main" w="9525">
                   <a:solidFill>
                     <a:srgbClr val="000000"/>
                   </a:solidFill>
@@ -953,7 +960,7 @@
             </a:ln>
             <a:extLst>
               <a:ext uri="{91240B29-F687-4f45-9708-019B960494DF}">
-                <a14:hiddenLine xmlns:a14="http://schemas.microsoft.com/office/drawing/2010/main" xmlns="" w="9525">
+                <a14:hiddenLine xmlns="" xmlns:a14="http://schemas.microsoft.com/office/drawing/2010/main" w="9525">
                   <a:solidFill>
                     <a:srgbClr val="000000"/>
                   </a:solidFill>
@@ -1043,7 +1050,7 @@
             </a:ln>
             <a:extLst>
               <a:ext uri="{91240B29-F687-4f45-9708-019B960494DF}">
-                <a14:hiddenLine xmlns:a14="http://schemas.microsoft.com/office/drawing/2010/main" xmlns="" w="9525">
+                <a14:hiddenLine xmlns="" xmlns:a14="http://schemas.microsoft.com/office/drawing/2010/main" w="9525">
                   <a:solidFill>
                     <a:srgbClr val="000000"/>
                   </a:solidFill>
@@ -1105,7 +1112,7 @@
             </a:ln>
             <a:extLst>
               <a:ext uri="{91240B29-F687-4f45-9708-019B960494DF}">
-                <a14:hiddenLine xmlns:a14="http://schemas.microsoft.com/office/drawing/2010/main" xmlns="" w="9525">
+                <a14:hiddenLine xmlns="" xmlns:a14="http://schemas.microsoft.com/office/drawing/2010/main" w="9525">
                   <a:solidFill>
                     <a:srgbClr val="000000"/>
                   </a:solidFill>
@@ -1215,7 +1222,7 @@
             </a:ln>
             <a:extLst>
               <a:ext uri="{91240B29-F687-4f45-9708-019B960494DF}">
-                <a14:hiddenLine xmlns:a14="http://schemas.microsoft.com/office/drawing/2010/main" xmlns="" w="9525">
+                <a14:hiddenLine xmlns="" xmlns:a14="http://schemas.microsoft.com/office/drawing/2010/main" w="9525">
                   <a:solidFill>
                     <a:srgbClr val="000000"/>
                   </a:solidFill>
@@ -1277,7 +1284,7 @@
             </a:ln>
             <a:extLst>
               <a:ext uri="{91240B29-F687-4f45-9708-019B960494DF}">
-                <a14:hiddenLine xmlns:a14="http://schemas.microsoft.com/office/drawing/2010/main" xmlns="" w="9525">
+                <a14:hiddenLine xmlns="" xmlns:a14="http://schemas.microsoft.com/office/drawing/2010/main" w="9525">
                   <a:solidFill>
                     <a:srgbClr val="000000"/>
                   </a:solidFill>
@@ -1367,7 +1374,7 @@
             </a:ln>
             <a:extLst>
               <a:ext uri="{91240B29-F687-4f45-9708-019B960494DF}">
-                <a14:hiddenLine xmlns:a14="http://schemas.microsoft.com/office/drawing/2010/main" xmlns="" w="9525">
+                <a14:hiddenLine xmlns="" xmlns:a14="http://schemas.microsoft.com/office/drawing/2010/main" w="9525">
                   <a:solidFill>
                     <a:srgbClr val="000000"/>
                   </a:solidFill>
@@ -1457,7 +1464,7 @@
             </a:ln>
             <a:extLst>
               <a:ext uri="{91240B29-F687-4f45-9708-019B960494DF}">
-                <a14:hiddenLine xmlns:a14="http://schemas.microsoft.com/office/drawing/2010/main" xmlns="" w="9525">
+                <a14:hiddenLine xmlns="" xmlns:a14="http://schemas.microsoft.com/office/drawing/2010/main" w="9525">
                   <a:solidFill>
                     <a:srgbClr val="000000"/>
                   </a:solidFill>
@@ -1519,7 +1526,7 @@
             </a:ln>
             <a:extLst>
               <a:ext uri="{91240B29-F687-4f45-9708-019B960494DF}">
-                <a14:hiddenLine xmlns:a14="http://schemas.microsoft.com/office/drawing/2010/main" xmlns="" w="9525">
+                <a14:hiddenLine xmlns="" xmlns:a14="http://schemas.microsoft.com/office/drawing/2010/main" w="9525">
                   <a:solidFill>
                     <a:srgbClr val="000000"/>
                   </a:solidFill>
@@ -1609,7 +1616,7 @@
             </a:ln>
             <a:extLst>
               <a:ext uri="{91240B29-F687-4f45-9708-019B960494DF}">
-                <a14:hiddenLine xmlns:a14="http://schemas.microsoft.com/office/drawing/2010/main" xmlns="" w="9525">
+                <a14:hiddenLine xmlns="" xmlns:a14="http://schemas.microsoft.com/office/drawing/2010/main" w="9525">
                   <a:solidFill>
                     <a:srgbClr val="000000"/>
                   </a:solidFill>
@@ -1699,7 +1706,7 @@
             </a:ln>
             <a:extLst>
               <a:ext uri="{91240B29-F687-4f45-9708-019B960494DF}">
-                <a14:hiddenLine xmlns:a14="http://schemas.microsoft.com/office/drawing/2010/main" xmlns="" w="9525">
+                <a14:hiddenLine xmlns="" xmlns:a14="http://schemas.microsoft.com/office/drawing/2010/main" w="9525">
                   <a:solidFill>
                     <a:srgbClr val="000000"/>
                   </a:solidFill>
@@ -1755,7 +1762,7 @@
             </a:ln>
             <a:extLst>
               <a:ext uri="{91240B29-F687-4f45-9708-019B960494DF}">
-                <a14:hiddenLine xmlns:a14="http://schemas.microsoft.com/office/drawing/2010/main" xmlns="" w="9525">
+                <a14:hiddenLine xmlns="" xmlns:a14="http://schemas.microsoft.com/office/drawing/2010/main" w="9525">
                   <a:solidFill>
                     <a:srgbClr val="000000"/>
                   </a:solidFill>
@@ -1845,7 +1852,7 @@
             </a:ln>
             <a:extLst>
               <a:ext uri="{91240B29-F687-4f45-9708-019B960494DF}">
-                <a14:hiddenLine xmlns:a14="http://schemas.microsoft.com/office/drawing/2010/main" xmlns="" w="9525">
+                <a14:hiddenLine xmlns="" xmlns:a14="http://schemas.microsoft.com/office/drawing/2010/main" w="9525">
                   <a:solidFill>
                     <a:srgbClr val="000000"/>
                   </a:solidFill>
@@ -1901,7 +1908,7 @@
             </a:ln>
             <a:extLst>
               <a:ext uri="{91240B29-F687-4f45-9708-019B960494DF}">
-                <a14:hiddenLine xmlns:a14="http://schemas.microsoft.com/office/drawing/2010/main" xmlns="" w="9525">
+                <a14:hiddenLine xmlns="" xmlns:a14="http://schemas.microsoft.com/office/drawing/2010/main" w="9525">
                   <a:solidFill>
                     <a:srgbClr val="000000"/>
                   </a:solidFill>
@@ -1991,7 +1998,7 @@
             </a:ln>
             <a:extLst>
               <a:ext uri="{91240B29-F687-4f45-9708-019B960494DF}">
-                <a14:hiddenLine xmlns:a14="http://schemas.microsoft.com/office/drawing/2010/main" xmlns="" w="9525">
+                <a14:hiddenLine xmlns="" xmlns:a14="http://schemas.microsoft.com/office/drawing/2010/main" w="9525">
                   <a:solidFill>
                     <a:srgbClr val="000000"/>
                   </a:solidFill>
@@ -2059,7 +2066,7 @@
             </a:ln>
             <a:extLst>
               <a:ext uri="{91240B29-F687-4f45-9708-019B960494DF}">
-                <a14:hiddenLine xmlns:a14="http://schemas.microsoft.com/office/drawing/2010/main" xmlns="" w="9525">
+                <a14:hiddenLine xmlns="" xmlns:a14="http://schemas.microsoft.com/office/drawing/2010/main" w="9525">
                   <a:solidFill>
                     <a:srgbClr val="000000"/>
                   </a:solidFill>
@@ -2149,7 +2156,7 @@
             </a:ln>
             <a:extLst>
               <a:ext uri="{91240B29-F687-4f45-9708-019B960494DF}">
-                <a14:hiddenLine xmlns:a14="http://schemas.microsoft.com/office/drawing/2010/main" xmlns="" w="9525">
+                <a14:hiddenLine xmlns="" xmlns:a14="http://schemas.microsoft.com/office/drawing/2010/main" w="9525">
                   <a:solidFill>
                     <a:srgbClr val="000000"/>
                   </a:solidFill>
@@ -2217,7 +2224,7 @@
             </a:ln>
             <a:extLst>
               <a:ext uri="{91240B29-F687-4f45-9708-019B960494DF}">
-                <a14:hiddenLine xmlns:a14="http://schemas.microsoft.com/office/drawing/2010/main" xmlns="" w="9525">
+                <a14:hiddenLine xmlns="" xmlns:a14="http://schemas.microsoft.com/office/drawing/2010/main" w="9525">
                   <a:solidFill>
                     <a:srgbClr val="000000"/>
                   </a:solidFill>
@@ -2307,7 +2314,7 @@
             </a:ln>
             <a:extLst>
               <a:ext uri="{91240B29-F687-4f45-9708-019B960494DF}">
-                <a14:hiddenLine xmlns:a14="http://schemas.microsoft.com/office/drawing/2010/main" xmlns="" w="9525">
+                <a14:hiddenLine xmlns="" xmlns:a14="http://schemas.microsoft.com/office/drawing/2010/main" w="9525">
                   <a:solidFill>
                     <a:srgbClr val="000000"/>
                   </a:solidFill>
@@ -2341,7 +2348,7 @@
             </a:ln>
             <a:extLst>
               <a:ext uri="{91240B29-F687-4f45-9708-019B960494DF}">
-                <a14:hiddenLine xmlns:a14="http://schemas.microsoft.com/office/drawing/2010/main" xmlns="" w="9525">
+                <a14:hiddenLine xmlns="" xmlns:a14="http://schemas.microsoft.com/office/drawing/2010/main" w="9525">
                   <a:solidFill>
                     <a:srgbClr val="000000"/>
                   </a:solidFill>
@@ -2431,7 +2438,7 @@
             </a:ln>
             <a:extLst>
               <a:ext uri="{91240B29-F687-4f45-9708-019B960494DF}">
-                <a14:hiddenLine xmlns:a14="http://schemas.microsoft.com/office/drawing/2010/main" xmlns="" w="9525">
+                <a14:hiddenLine xmlns="" xmlns:a14="http://schemas.microsoft.com/office/drawing/2010/main" w="9525">
                   <a:solidFill>
                     <a:srgbClr val="000000"/>
                   </a:solidFill>
@@ -2493,7 +2500,7 @@
             </a:ln>
             <a:extLst>
               <a:ext uri="{91240B29-F687-4f45-9708-019B960494DF}">
-                <a14:hiddenLine xmlns:a14="http://schemas.microsoft.com/office/drawing/2010/main" xmlns="" w="9525">
+                <a14:hiddenLine xmlns="" xmlns:a14="http://schemas.microsoft.com/office/drawing/2010/main" w="9525">
                   <a:solidFill>
                     <a:srgbClr val="000000"/>
                   </a:solidFill>
@@ -2555,7 +2562,7 @@
             </a:ln>
             <a:extLst>
               <a:ext uri="{91240B29-F687-4f45-9708-019B960494DF}">
-                <a14:hiddenLine xmlns:a14="http://schemas.microsoft.com/office/drawing/2010/main" xmlns="" w="9525">
+                <a14:hiddenLine xmlns="" xmlns:a14="http://schemas.microsoft.com/office/drawing/2010/main" w="9525">
                   <a:solidFill>
                     <a:srgbClr val="000000"/>
                   </a:solidFill>
@@ -2645,7 +2652,7 @@
             </a:ln>
             <a:extLst>
               <a:ext uri="{91240B29-F687-4f45-9708-019B960494DF}">
-                <a14:hiddenLine xmlns:a14="http://schemas.microsoft.com/office/drawing/2010/main" xmlns="" w="9525">
+                <a14:hiddenLine xmlns="" xmlns:a14="http://schemas.microsoft.com/office/drawing/2010/main" w="9525">
                   <a:solidFill>
                     <a:srgbClr val="000000"/>
                   </a:solidFill>
@@ -2713,7 +2720,7 @@
             </a:ln>
             <a:extLst>
               <a:ext uri="{91240B29-F687-4f45-9708-019B960494DF}">
-                <a14:hiddenLine xmlns:a14="http://schemas.microsoft.com/office/drawing/2010/main" xmlns="" w="9525">
+                <a14:hiddenLine xmlns="" xmlns:a14="http://schemas.microsoft.com/office/drawing/2010/main" w="9525">
                   <a:solidFill>
                     <a:srgbClr val="000000"/>
                   </a:solidFill>
@@ -2775,7 +2782,7 @@
             </a:ln>
             <a:extLst>
               <a:ext uri="{91240B29-F687-4f45-9708-019B960494DF}">
-                <a14:hiddenLine xmlns:a14="http://schemas.microsoft.com/office/drawing/2010/main" xmlns="" w="9525">
+                <a14:hiddenLine xmlns="" xmlns:a14="http://schemas.microsoft.com/office/drawing/2010/main" w="9525">
                   <a:solidFill>
                     <a:srgbClr val="000000"/>
                   </a:solidFill>
@@ -2865,7 +2872,7 @@
             </a:ln>
             <a:extLst>
               <a:ext uri="{91240B29-F687-4f45-9708-019B960494DF}">
-                <a14:hiddenLine xmlns:a14="http://schemas.microsoft.com/office/drawing/2010/main" xmlns="" w="9525">
+                <a14:hiddenLine xmlns="" xmlns:a14="http://schemas.microsoft.com/office/drawing/2010/main" w="9525">
                   <a:solidFill>
                     <a:srgbClr val="000000"/>
                   </a:solidFill>
@@ -2927,7 +2934,7 @@
             </a:ln>
             <a:extLst>
               <a:ext uri="{91240B29-F687-4f45-9708-019B960494DF}">
-                <a14:hiddenLine xmlns:a14="http://schemas.microsoft.com/office/drawing/2010/main" xmlns="" w="9525">
+                <a14:hiddenLine xmlns="" xmlns:a14="http://schemas.microsoft.com/office/drawing/2010/main" w="9525">
                   <a:solidFill>
                     <a:srgbClr val="000000"/>
                   </a:solidFill>
@@ -3017,7 +3024,7 @@
             </a:ln>
             <a:extLst>
               <a:ext uri="{91240B29-F687-4f45-9708-019B960494DF}">
-                <a14:hiddenLine xmlns:a14="http://schemas.microsoft.com/office/drawing/2010/main" xmlns="" w="9525">
+                <a14:hiddenLine xmlns="" xmlns:a14="http://schemas.microsoft.com/office/drawing/2010/main" w="9525">
                   <a:solidFill>
                     <a:srgbClr val="000000"/>
                   </a:solidFill>
@@ -3079,7 +3086,7 @@
             </a:ln>
             <a:extLst>
               <a:ext uri="{91240B29-F687-4f45-9708-019B960494DF}">
-                <a14:hiddenLine xmlns:a14="http://schemas.microsoft.com/office/drawing/2010/main" xmlns="" w="9525">
+                <a14:hiddenLine xmlns="" xmlns:a14="http://schemas.microsoft.com/office/drawing/2010/main" w="9525">
                   <a:solidFill>
                     <a:srgbClr val="000000"/>
                   </a:solidFill>
@@ -3169,7 +3176,7 @@
             </a:ln>
             <a:extLst>
               <a:ext uri="{91240B29-F687-4f45-9708-019B960494DF}">
-                <a14:hiddenLine xmlns:a14="http://schemas.microsoft.com/office/drawing/2010/main" xmlns="" w="9525">
+                <a14:hiddenLine xmlns="" xmlns:a14="http://schemas.microsoft.com/office/drawing/2010/main" w="9525">
                   <a:solidFill>
                     <a:srgbClr val="000000"/>
                   </a:solidFill>
@@ -3203,7 +3210,7 @@
             </a:ln>
             <a:extLst>
               <a:ext uri="{91240B29-F687-4f45-9708-019B960494DF}">
-                <a14:hiddenLine xmlns:a14="http://schemas.microsoft.com/office/drawing/2010/main" xmlns="" w="9525">
+                <a14:hiddenLine xmlns="" xmlns:a14="http://schemas.microsoft.com/office/drawing/2010/main" w="9525">
                   <a:solidFill>
                     <a:srgbClr val="000000"/>
                   </a:solidFill>
@@ -3268,7 +3275,7 @@
             </a:ln>
             <a:extLst>
               <a:ext uri="{91240B29-F687-4f45-9708-019B960494DF}">
-                <a14:hiddenLine xmlns:a14="http://schemas.microsoft.com/office/drawing/2010/main" xmlns="" w="9525">
+                <a14:hiddenLine xmlns="" xmlns:a14="http://schemas.microsoft.com/office/drawing/2010/main" w="9525">
                   <a:solidFill>
                     <a:srgbClr val="000000"/>
                   </a:solidFill>
@@ -3358,7 +3365,7 @@
             </a:ln>
             <a:extLst>
               <a:ext uri="{91240B29-F687-4f45-9708-019B960494DF}">
-                <a14:hiddenLine xmlns:a14="http://schemas.microsoft.com/office/drawing/2010/main" xmlns="" w="9525">
+                <a14:hiddenLine xmlns="" xmlns:a14="http://schemas.microsoft.com/office/drawing/2010/main" w="9525">
                   <a:solidFill>
                     <a:srgbClr val="000000"/>
                   </a:solidFill>
@@ -3420,7 +3427,7 @@
             </a:ln>
             <a:extLst>
               <a:ext uri="{91240B29-F687-4f45-9708-019B960494DF}">
-                <a14:hiddenLine xmlns:a14="http://schemas.microsoft.com/office/drawing/2010/main" xmlns="" w="9525">
+                <a14:hiddenLine xmlns="" xmlns:a14="http://schemas.microsoft.com/office/drawing/2010/main" w="9525">
                   <a:solidFill>
                     <a:srgbClr val="000000"/>
                   </a:solidFill>
@@ -3510,7 +3517,7 @@
             </a:ln>
             <a:extLst>
               <a:ext uri="{91240B29-F687-4f45-9708-019B960494DF}">
-                <a14:hiddenLine xmlns:a14="http://schemas.microsoft.com/office/drawing/2010/main" xmlns="" w="9525">
+                <a14:hiddenLine xmlns="" xmlns:a14="http://schemas.microsoft.com/office/drawing/2010/main" w="9525">
                   <a:solidFill>
                     <a:srgbClr val="000000"/>
                   </a:solidFill>
@@ -3600,7 +3607,7 @@
             </a:ln>
             <a:extLst>
               <a:ext uri="{91240B29-F687-4f45-9708-019B960494DF}">
-                <a14:hiddenLine xmlns:a14="http://schemas.microsoft.com/office/drawing/2010/main" xmlns="" w="9525">
+                <a14:hiddenLine xmlns="" xmlns:a14="http://schemas.microsoft.com/office/drawing/2010/main" w="9525">
                   <a:solidFill>
                     <a:srgbClr val="000000"/>
                   </a:solidFill>
@@ -3665,7 +3672,7 @@
             </a:ln>
             <a:extLst>
               <a:ext uri="{91240B29-F687-4f45-9708-019B960494DF}">
-                <a14:hiddenLine xmlns:a14="http://schemas.microsoft.com/office/drawing/2010/main" xmlns="" w="9525">
+                <a14:hiddenLine xmlns="" xmlns:a14="http://schemas.microsoft.com/office/drawing/2010/main" w="9525">
                   <a:solidFill>
                     <a:srgbClr val="000000"/>
                   </a:solidFill>
@@ -3727,7 +3734,7 @@
             </a:ln>
             <a:extLst>
               <a:ext uri="{91240B29-F687-4f45-9708-019B960494DF}">
-                <a14:hiddenLine xmlns:a14="http://schemas.microsoft.com/office/drawing/2010/main" xmlns="" w="9525">
+                <a14:hiddenLine xmlns="" xmlns:a14="http://schemas.microsoft.com/office/drawing/2010/main" w="9525">
                   <a:solidFill>
                     <a:srgbClr val="000000"/>
                   </a:solidFill>
@@ -3817,7 +3824,7 @@
             </a:ln>
             <a:extLst>
               <a:ext uri="{91240B29-F687-4f45-9708-019B960494DF}">
-                <a14:hiddenLine xmlns:a14="http://schemas.microsoft.com/office/drawing/2010/main" xmlns="" w="9525">
+                <a14:hiddenLine xmlns="" xmlns:a14="http://schemas.microsoft.com/office/drawing/2010/main" w="9525">
                   <a:solidFill>
                     <a:srgbClr val="000000"/>
                   </a:solidFill>
@@ -3907,7 +3914,7 @@
             </a:ln>
             <a:extLst>
               <a:ext uri="{91240B29-F687-4f45-9708-019B960494DF}">
-                <a14:hiddenLine xmlns:a14="http://schemas.microsoft.com/office/drawing/2010/main" xmlns="" w="9525">
+                <a14:hiddenLine xmlns="" xmlns:a14="http://schemas.microsoft.com/office/drawing/2010/main" w="9525">
                   <a:solidFill>
                     <a:srgbClr val="000000"/>
                   </a:solidFill>
@@ -3969,7 +3976,7 @@
             </a:ln>
             <a:extLst>
               <a:ext uri="{91240B29-F687-4f45-9708-019B960494DF}">
-                <a14:hiddenLine xmlns:a14="http://schemas.microsoft.com/office/drawing/2010/main" xmlns="" w="9525">
+                <a14:hiddenLine xmlns="" xmlns:a14="http://schemas.microsoft.com/office/drawing/2010/main" w="9525">
                   <a:solidFill>
                     <a:srgbClr val="000000"/>
                   </a:solidFill>
@@ -4089,7 +4096,7 @@
             </a:ln>
             <a:extLst>
               <a:ext uri="{91240B29-F687-4f45-9708-019B960494DF}">
-                <a14:hiddenLine xmlns:a14="http://schemas.microsoft.com/office/drawing/2010/main" xmlns="" w="9525">
+                <a14:hiddenLine xmlns="" xmlns:a14="http://schemas.microsoft.com/office/drawing/2010/main" w="9525">
                   <a:solidFill>
                     <a:srgbClr val="000000"/>
                   </a:solidFill>
@@ -4157,7 +4164,7 @@
             </a:ln>
             <a:extLst>
               <a:ext uri="{91240B29-F687-4f45-9708-019B960494DF}">
-                <a14:hiddenLine xmlns:a14="http://schemas.microsoft.com/office/drawing/2010/main" xmlns="" w="9525">
+                <a14:hiddenLine xmlns="" xmlns:a14="http://schemas.microsoft.com/office/drawing/2010/main" w="9525">
                   <a:solidFill>
                     <a:srgbClr val="000000"/>
                   </a:solidFill>
@@ -4247,7 +4254,7 @@
             </a:ln>
             <a:extLst>
               <a:ext uri="{91240B29-F687-4f45-9708-019B960494DF}">
-                <a14:hiddenLine xmlns:a14="http://schemas.microsoft.com/office/drawing/2010/main" xmlns="" w="9525">
+                <a14:hiddenLine xmlns="" xmlns:a14="http://schemas.microsoft.com/office/drawing/2010/main" w="9525">
                   <a:solidFill>
                     <a:srgbClr val="000000"/>
                   </a:solidFill>
@@ -4387,7 +4394,7 @@
           <a:p>
             <a:fld id="{EB8BC949-8001-4128-9B2B-8E29415BD44B}" type="datetimeFigureOut">
               <a:rPr lang="es-CL" smtClean="0"/>
-              <a:t>25-01-2019</a:t>
+              <a:t>26-01-2019</a:t>
             </a:fld>
             <a:endParaRPr lang="es-CL"/>
           </a:p>
@@ -4654,7 +4661,7 @@
           <a:p>
             <a:fld id="{EB8BC949-8001-4128-9B2B-8E29415BD44B}" type="datetimeFigureOut">
               <a:rPr lang="es-CL" smtClean="0"/>
-              <a:t>25-01-2019</a:t>
+              <a:t>26-01-2019</a:t>
             </a:fld>
             <a:endParaRPr lang="es-CL"/>
           </a:p>
@@ -4850,7 +4857,7 @@
           <a:p>
             <a:fld id="{EB8BC949-8001-4128-9B2B-8E29415BD44B}" type="datetimeFigureOut">
               <a:rPr lang="es-CL" smtClean="0"/>
-              <a:t>25-01-2019</a:t>
+              <a:t>26-01-2019</a:t>
             </a:fld>
             <a:endParaRPr lang="es-CL"/>
           </a:p>
@@ -5113,7 +5120,7 @@
           <a:p>
             <a:fld id="{EB8BC949-8001-4128-9B2B-8E29415BD44B}" type="datetimeFigureOut">
               <a:rPr lang="es-CL" smtClean="0"/>
-              <a:t>25-01-2019</a:t>
+              <a:t>26-01-2019</a:t>
             </a:fld>
             <a:endParaRPr lang="es-CL"/>
           </a:p>
@@ -5547,7 +5554,7 @@
           <a:p>
             <a:fld id="{EB8BC949-8001-4128-9B2B-8E29415BD44B}" type="datetimeFigureOut">
               <a:rPr lang="es-CL" smtClean="0"/>
-              <a:t>25-01-2019</a:t>
+              <a:t>26-01-2019</a:t>
             </a:fld>
             <a:endParaRPr lang="es-CL"/>
           </a:p>
@@ -6093,7 +6100,7 @@
           <a:p>
             <a:fld id="{EB8BC949-8001-4128-9B2B-8E29415BD44B}" type="datetimeFigureOut">
               <a:rPr lang="es-CL" smtClean="0"/>
-              <a:t>25-01-2019</a:t>
+              <a:t>26-01-2019</a:t>
             </a:fld>
             <a:endParaRPr lang="es-CL"/>
           </a:p>
@@ -6813,7 +6820,7 @@
           <a:p>
             <a:fld id="{EB8BC949-8001-4128-9B2B-8E29415BD44B}" type="datetimeFigureOut">
               <a:rPr lang="es-CL" smtClean="0"/>
-              <a:t>25-01-2019</a:t>
+              <a:t>26-01-2019</a:t>
             </a:fld>
             <a:endParaRPr lang="es-CL"/>
           </a:p>
@@ -6983,7 +6990,7 @@
           <a:p>
             <a:fld id="{EB8BC949-8001-4128-9B2B-8E29415BD44B}" type="datetimeFigureOut">
               <a:rPr lang="es-CL" smtClean="0"/>
-              <a:t>25-01-2019</a:t>
+              <a:t>26-01-2019</a:t>
             </a:fld>
             <a:endParaRPr lang="es-CL"/>
           </a:p>
@@ -7163,7 +7170,7 @@
           <a:p>
             <a:fld id="{EB8BC949-8001-4128-9B2B-8E29415BD44B}" type="datetimeFigureOut">
               <a:rPr lang="es-CL" smtClean="0"/>
-              <a:t>25-01-2019</a:t>
+              <a:t>26-01-2019</a:t>
             </a:fld>
             <a:endParaRPr lang="es-CL"/>
           </a:p>
@@ -7333,7 +7340,7 @@
           <a:p>
             <a:fld id="{EB8BC949-8001-4128-9B2B-8E29415BD44B}" type="datetimeFigureOut">
               <a:rPr lang="es-CL" smtClean="0"/>
-              <a:t>25-01-2019</a:t>
+              <a:t>26-01-2019</a:t>
             </a:fld>
             <a:endParaRPr lang="es-CL"/>
           </a:p>
@@ -7583,7 +7590,7 @@
           <a:p>
             <a:fld id="{EB8BC949-8001-4128-9B2B-8E29415BD44B}" type="datetimeFigureOut">
               <a:rPr lang="es-CL" smtClean="0"/>
-              <a:t>25-01-2019</a:t>
+              <a:t>26-01-2019</a:t>
             </a:fld>
             <a:endParaRPr lang="es-CL"/>
           </a:p>
@@ -7815,7 +7822,7 @@
           <a:p>
             <a:fld id="{EB8BC949-8001-4128-9B2B-8E29415BD44B}" type="datetimeFigureOut">
               <a:rPr lang="es-CL" smtClean="0"/>
-              <a:t>25-01-2019</a:t>
+              <a:t>26-01-2019</a:t>
             </a:fld>
             <a:endParaRPr lang="es-CL"/>
           </a:p>
@@ -8196,7 +8203,7 @@
           <a:p>
             <a:fld id="{EB8BC949-8001-4128-9B2B-8E29415BD44B}" type="datetimeFigureOut">
               <a:rPr lang="es-CL" smtClean="0"/>
-              <a:t>25-01-2019</a:t>
+              <a:t>26-01-2019</a:t>
             </a:fld>
             <a:endParaRPr lang="es-CL"/>
           </a:p>
@@ -8314,7 +8321,7 @@
           <a:p>
             <a:fld id="{EB8BC949-8001-4128-9B2B-8E29415BD44B}" type="datetimeFigureOut">
               <a:rPr lang="es-CL" smtClean="0"/>
-              <a:t>25-01-2019</a:t>
+              <a:t>26-01-2019</a:t>
             </a:fld>
             <a:endParaRPr lang="es-CL"/>
           </a:p>
@@ -8409,7 +8416,7 @@
           <a:p>
             <a:fld id="{EB8BC949-8001-4128-9B2B-8E29415BD44B}" type="datetimeFigureOut">
               <a:rPr lang="es-CL" smtClean="0"/>
-              <a:t>25-01-2019</a:t>
+              <a:t>26-01-2019</a:t>
             </a:fld>
             <a:endParaRPr lang="es-CL"/>
           </a:p>
@@ -8658,7 +8665,7 @@
           <a:p>
             <a:fld id="{EB8BC949-8001-4128-9B2B-8E29415BD44B}" type="datetimeFigureOut">
               <a:rPr lang="es-CL" smtClean="0"/>
-              <a:t>25-01-2019</a:t>
+              <a:t>26-01-2019</a:t>
             </a:fld>
             <a:endParaRPr lang="es-CL"/>
           </a:p>
@@ -8938,7 +8945,7 @@
           <a:p>
             <a:fld id="{EB8BC949-8001-4128-9B2B-8E29415BD44B}" type="datetimeFigureOut">
               <a:rPr lang="es-CL" smtClean="0"/>
-              <a:t>25-01-2019</a:t>
+              <a:t>26-01-2019</a:t>
             </a:fld>
             <a:endParaRPr lang="es-CL"/>
           </a:p>
@@ -9054,7 +9061,7 @@
           <a:noFill/>
           <a:extLst>
             <a:ext uri="{909E8E84-426E-40dd-AFC4-6F175D3DCCD1}">
-              <a14:hiddenFill xmlns:a14="http://schemas.microsoft.com/office/drawing/2010/main" xmlns="">
+              <a14:hiddenFill xmlns="" xmlns:a14="http://schemas.microsoft.com/office/drawing/2010/main">
                 <a:solidFill>
                   <a:srgbClr val="FFFFFF"/>
                 </a:solidFill>
@@ -9128,7 +9135,7 @@
               </a:ln>
               <a:extLst>
                 <a:ext uri="{91240B29-F687-4f45-9708-019B960494DF}">
-                  <a14:hiddenLine xmlns:a14="http://schemas.microsoft.com/office/drawing/2010/main" xmlns="" w="9525">
+                  <a14:hiddenLine xmlns="" xmlns:a14="http://schemas.microsoft.com/office/drawing/2010/main" w="9525">
                     <a:solidFill>
                       <a:srgbClr val="000000"/>
                     </a:solidFill>
@@ -9218,7 +9225,7 @@
               </a:ln>
               <a:extLst>
                 <a:ext uri="{91240B29-F687-4f45-9708-019B960494DF}">
-                  <a14:hiddenLine xmlns:a14="http://schemas.microsoft.com/office/drawing/2010/main" xmlns="" w="9525">
+                  <a14:hiddenLine xmlns="" xmlns:a14="http://schemas.microsoft.com/office/drawing/2010/main" w="9525">
                     <a:solidFill>
                       <a:srgbClr val="000000"/>
                     </a:solidFill>
@@ -9308,7 +9315,7 @@
               </a:ln>
               <a:extLst>
                 <a:ext uri="{91240B29-F687-4f45-9708-019B960494DF}">
-                  <a14:hiddenLine xmlns:a14="http://schemas.microsoft.com/office/drawing/2010/main" xmlns="" w="9525">
+                  <a14:hiddenLine xmlns="" xmlns:a14="http://schemas.microsoft.com/office/drawing/2010/main" w="9525">
                     <a:solidFill>
                       <a:srgbClr val="000000"/>
                     </a:solidFill>
@@ -9370,7 +9377,7 @@
               </a:ln>
               <a:extLst>
                 <a:ext uri="{91240B29-F687-4f45-9708-019B960494DF}">
-                  <a14:hiddenLine xmlns:a14="http://schemas.microsoft.com/office/drawing/2010/main" xmlns="" w="9525">
+                  <a14:hiddenLine xmlns="" xmlns:a14="http://schemas.microsoft.com/office/drawing/2010/main" w="9525">
                     <a:solidFill>
                       <a:srgbClr val="000000"/>
                     </a:solidFill>
@@ -9460,7 +9467,7 @@
               </a:ln>
               <a:extLst>
                 <a:ext uri="{91240B29-F687-4f45-9708-019B960494DF}">
-                  <a14:hiddenLine xmlns:a14="http://schemas.microsoft.com/office/drawing/2010/main" xmlns="" w="9525">
+                  <a14:hiddenLine xmlns="" xmlns:a14="http://schemas.microsoft.com/office/drawing/2010/main" w="9525">
                     <a:solidFill>
                       <a:srgbClr val="000000"/>
                     </a:solidFill>
@@ -9522,7 +9529,7 @@
               </a:ln>
               <a:extLst>
                 <a:ext uri="{91240B29-F687-4f45-9708-019B960494DF}">
-                  <a14:hiddenLine xmlns:a14="http://schemas.microsoft.com/office/drawing/2010/main" xmlns="" w="9525">
+                  <a14:hiddenLine xmlns="" xmlns:a14="http://schemas.microsoft.com/office/drawing/2010/main" w="9525">
                     <a:solidFill>
                       <a:srgbClr val="000000"/>
                     </a:solidFill>
@@ -9584,7 +9591,7 @@
               </a:ln>
               <a:extLst>
                 <a:ext uri="{91240B29-F687-4f45-9708-019B960494DF}">
-                  <a14:hiddenLine xmlns:a14="http://schemas.microsoft.com/office/drawing/2010/main" xmlns="" w="9525">
+                  <a14:hiddenLine xmlns="" xmlns:a14="http://schemas.microsoft.com/office/drawing/2010/main" w="9525">
                     <a:solidFill>
                       <a:srgbClr val="000000"/>
                     </a:solidFill>
@@ -9674,7 +9681,7 @@
               </a:ln>
               <a:extLst>
                 <a:ext uri="{91240B29-F687-4f45-9708-019B960494DF}">
-                  <a14:hiddenLine xmlns:a14="http://schemas.microsoft.com/office/drawing/2010/main" xmlns="" w="9525">
+                  <a14:hiddenLine xmlns="" xmlns:a14="http://schemas.microsoft.com/office/drawing/2010/main" w="9525">
                     <a:solidFill>
                       <a:srgbClr val="000000"/>
                     </a:solidFill>
@@ -9764,7 +9771,7 @@
               </a:ln>
               <a:extLst>
                 <a:ext uri="{91240B29-F687-4f45-9708-019B960494DF}">
-                  <a14:hiddenLine xmlns:a14="http://schemas.microsoft.com/office/drawing/2010/main" xmlns="" w="9525">
+                  <a14:hiddenLine xmlns="" xmlns:a14="http://schemas.microsoft.com/office/drawing/2010/main" w="9525">
                     <a:solidFill>
                       <a:srgbClr val="000000"/>
                     </a:solidFill>
@@ -9826,7 +9833,7 @@
               </a:ln>
               <a:extLst>
                 <a:ext uri="{91240B29-F687-4f45-9708-019B960494DF}">
-                  <a14:hiddenLine xmlns:a14="http://schemas.microsoft.com/office/drawing/2010/main" xmlns="" w="9525">
+                  <a14:hiddenLine xmlns="" xmlns:a14="http://schemas.microsoft.com/office/drawing/2010/main" w="9525">
                     <a:solidFill>
                       <a:srgbClr val="000000"/>
                     </a:solidFill>
@@ -9936,7 +9943,7 @@
               </a:ln>
               <a:extLst>
                 <a:ext uri="{91240B29-F687-4f45-9708-019B960494DF}">
-                  <a14:hiddenLine xmlns:a14="http://schemas.microsoft.com/office/drawing/2010/main" xmlns="" w="9525">
+                  <a14:hiddenLine xmlns="" xmlns:a14="http://schemas.microsoft.com/office/drawing/2010/main" w="9525">
                     <a:solidFill>
                       <a:srgbClr val="000000"/>
                     </a:solidFill>
@@ -10020,7 +10027,7 @@
               </a:ln>
               <a:extLst>
                 <a:ext uri="{91240B29-F687-4f45-9708-019B960494DF}">
-                  <a14:hiddenLine xmlns:a14="http://schemas.microsoft.com/office/drawing/2010/main" xmlns="" w="9525">
+                  <a14:hiddenLine xmlns="" xmlns:a14="http://schemas.microsoft.com/office/drawing/2010/main" w="9525">
                     <a:solidFill>
                       <a:srgbClr val="000000"/>
                     </a:solidFill>
@@ -10082,7 +10089,7 @@
               </a:ln>
               <a:extLst>
                 <a:ext uri="{91240B29-F687-4f45-9708-019B960494DF}">
-                  <a14:hiddenLine xmlns:a14="http://schemas.microsoft.com/office/drawing/2010/main" xmlns="" w="9525">
+                  <a14:hiddenLine xmlns="" xmlns:a14="http://schemas.microsoft.com/office/drawing/2010/main" w="9525">
                     <a:solidFill>
                       <a:srgbClr val="000000"/>
                     </a:solidFill>
@@ -10144,7 +10151,7 @@
               </a:ln>
               <a:extLst>
                 <a:ext uri="{91240B29-F687-4f45-9708-019B960494DF}">
-                  <a14:hiddenLine xmlns:a14="http://schemas.microsoft.com/office/drawing/2010/main" xmlns="" w="9525">
+                  <a14:hiddenLine xmlns="" xmlns:a14="http://schemas.microsoft.com/office/drawing/2010/main" w="9525">
                     <a:solidFill>
                       <a:srgbClr val="000000"/>
                     </a:solidFill>
@@ -10234,7 +10241,7 @@
               </a:ln>
               <a:extLst>
                 <a:ext uri="{91240B29-F687-4f45-9708-019B960494DF}">
-                  <a14:hiddenLine xmlns:a14="http://schemas.microsoft.com/office/drawing/2010/main" xmlns="" w="9525">
+                  <a14:hiddenLine xmlns="" xmlns:a14="http://schemas.microsoft.com/office/drawing/2010/main" w="9525">
                     <a:solidFill>
                       <a:srgbClr val="000000"/>
                     </a:solidFill>
@@ -10268,7 +10275,7 @@
               </a:ln>
               <a:extLst>
                 <a:ext uri="{91240B29-F687-4f45-9708-019B960494DF}">
-                  <a14:hiddenLine xmlns:a14="http://schemas.microsoft.com/office/drawing/2010/main" xmlns="" w="9525">
+                  <a14:hiddenLine xmlns="" xmlns:a14="http://schemas.microsoft.com/office/drawing/2010/main" w="9525">
                     <a:solidFill>
                       <a:srgbClr val="000000"/>
                     </a:solidFill>
@@ -10333,7 +10340,7 @@
               </a:ln>
               <a:extLst>
                 <a:ext uri="{91240B29-F687-4f45-9708-019B960494DF}">
-                  <a14:hiddenLine xmlns:a14="http://schemas.microsoft.com/office/drawing/2010/main" xmlns="" w="9525">
+                  <a14:hiddenLine xmlns="" xmlns:a14="http://schemas.microsoft.com/office/drawing/2010/main" w="9525">
                     <a:solidFill>
                       <a:srgbClr val="000000"/>
                     </a:solidFill>
@@ -10423,7 +10430,7 @@
               </a:ln>
               <a:extLst>
                 <a:ext uri="{91240B29-F687-4f45-9708-019B960494DF}">
-                  <a14:hiddenLine xmlns:a14="http://schemas.microsoft.com/office/drawing/2010/main" xmlns="" w="9525">
+                  <a14:hiddenLine xmlns="" xmlns:a14="http://schemas.microsoft.com/office/drawing/2010/main" w="9525">
                     <a:solidFill>
                       <a:srgbClr val="000000"/>
                     </a:solidFill>
@@ -10485,7 +10492,7 @@
               </a:ln>
               <a:extLst>
                 <a:ext uri="{91240B29-F687-4f45-9708-019B960494DF}">
-                  <a14:hiddenLine xmlns:a14="http://schemas.microsoft.com/office/drawing/2010/main" xmlns="" w="9525">
+                  <a14:hiddenLine xmlns="" xmlns:a14="http://schemas.microsoft.com/office/drawing/2010/main" w="9525">
                     <a:solidFill>
                       <a:srgbClr val="000000"/>
                     </a:solidFill>
@@ -10575,7 +10582,7 @@
               </a:ln>
               <a:extLst>
                 <a:ext uri="{91240B29-F687-4f45-9708-019B960494DF}">
-                  <a14:hiddenLine xmlns:a14="http://schemas.microsoft.com/office/drawing/2010/main" xmlns="" w="9525">
+                  <a14:hiddenLine xmlns="" xmlns:a14="http://schemas.microsoft.com/office/drawing/2010/main" w="9525">
                     <a:solidFill>
                       <a:srgbClr val="000000"/>
                     </a:solidFill>
@@ -10640,7 +10647,7 @@
               </a:ln>
               <a:extLst>
                 <a:ext uri="{91240B29-F687-4f45-9708-019B960494DF}">
-                  <a14:hiddenLine xmlns:a14="http://schemas.microsoft.com/office/drawing/2010/main" xmlns="" w="9525">
+                  <a14:hiddenLine xmlns="" xmlns:a14="http://schemas.microsoft.com/office/drawing/2010/main" w="9525">
                     <a:solidFill>
                       <a:srgbClr val="000000"/>
                     </a:solidFill>
@@ -10702,7 +10709,7 @@
               </a:ln>
               <a:extLst>
                 <a:ext uri="{91240B29-F687-4f45-9708-019B960494DF}">
-                  <a14:hiddenLine xmlns:a14="http://schemas.microsoft.com/office/drawing/2010/main" xmlns="" w="9525">
+                  <a14:hiddenLine xmlns="" xmlns:a14="http://schemas.microsoft.com/office/drawing/2010/main" w="9525">
                     <a:solidFill>
                       <a:srgbClr val="000000"/>
                     </a:solidFill>
@@ -10792,7 +10799,7 @@
               </a:ln>
               <a:extLst>
                 <a:ext uri="{91240B29-F687-4f45-9708-019B960494DF}">
-                  <a14:hiddenLine xmlns:a14="http://schemas.microsoft.com/office/drawing/2010/main" xmlns="" w="9525">
+                  <a14:hiddenLine xmlns="" xmlns:a14="http://schemas.microsoft.com/office/drawing/2010/main" w="9525">
                     <a:solidFill>
                       <a:srgbClr val="000000"/>
                     </a:solidFill>
@@ -10882,7 +10889,7 @@
               </a:ln>
               <a:extLst>
                 <a:ext uri="{91240B29-F687-4f45-9708-019B960494DF}">
-                  <a14:hiddenLine xmlns:a14="http://schemas.microsoft.com/office/drawing/2010/main" xmlns="" w="9525">
+                  <a14:hiddenLine xmlns="" xmlns:a14="http://schemas.microsoft.com/office/drawing/2010/main" w="9525">
                     <a:solidFill>
                       <a:srgbClr val="000000"/>
                     </a:solidFill>
@@ -10947,7 +10954,7 @@
               </a:ln>
               <a:extLst>
                 <a:ext uri="{91240B29-F687-4f45-9708-019B960494DF}">
-                  <a14:hiddenLine xmlns:a14="http://schemas.microsoft.com/office/drawing/2010/main" xmlns="" w="9525">
+                  <a14:hiddenLine xmlns="" xmlns:a14="http://schemas.microsoft.com/office/drawing/2010/main" w="9525">
                     <a:solidFill>
                       <a:srgbClr val="000000"/>
                     </a:solidFill>
@@ -11067,7 +11074,7 @@
               </a:ln>
               <a:extLst>
                 <a:ext uri="{91240B29-F687-4f45-9708-019B960494DF}">
-                  <a14:hiddenLine xmlns:a14="http://schemas.microsoft.com/office/drawing/2010/main" xmlns="" w="9525">
+                  <a14:hiddenLine xmlns="" xmlns:a14="http://schemas.microsoft.com/office/drawing/2010/main" w="9525">
                     <a:solidFill>
                       <a:srgbClr val="000000"/>
                     </a:solidFill>
@@ -11165,7 +11172,7 @@
               </a:ln>
               <a:extLst>
                 <a:ext uri="{91240B29-F687-4f45-9708-019B960494DF}">
-                  <a14:hiddenLine xmlns:a14="http://schemas.microsoft.com/office/drawing/2010/main" xmlns="" w="9525">
+                  <a14:hiddenLine xmlns="" xmlns:a14="http://schemas.microsoft.com/office/drawing/2010/main" w="9525">
                     <a:solidFill>
                       <a:srgbClr val="000000"/>
                     </a:solidFill>
@@ -11280,7 +11287,7 @@
               </a:ln>
               <a:extLst>
                 <a:ext uri="{91240B29-F687-4f45-9708-019B960494DF}">
-                  <a14:hiddenLine xmlns:a14="http://schemas.microsoft.com/office/drawing/2010/main" xmlns="" w="9525">
+                  <a14:hiddenLine xmlns="" xmlns:a14="http://schemas.microsoft.com/office/drawing/2010/main" w="9525">
                     <a:solidFill>
                       <a:srgbClr val="000000"/>
                     </a:solidFill>
@@ -11370,7 +11377,7 @@
               </a:ln>
               <a:extLst>
                 <a:ext uri="{91240B29-F687-4f45-9708-019B960494DF}">
-                  <a14:hiddenLine xmlns:a14="http://schemas.microsoft.com/office/drawing/2010/main" xmlns="" w="9525">
+                  <a14:hiddenLine xmlns="" xmlns:a14="http://schemas.microsoft.com/office/drawing/2010/main" w="9525">
                     <a:solidFill>
                       <a:srgbClr val="000000"/>
                     </a:solidFill>
@@ -11435,7 +11442,7 @@
               </a:ln>
               <a:extLst>
                 <a:ext uri="{91240B29-F687-4f45-9708-019B960494DF}">
-                  <a14:hiddenLine xmlns:a14="http://schemas.microsoft.com/office/drawing/2010/main" xmlns="" w="9525">
+                  <a14:hiddenLine xmlns="" xmlns:a14="http://schemas.microsoft.com/office/drawing/2010/main" w="9525">
                     <a:solidFill>
                       <a:srgbClr val="000000"/>
                     </a:solidFill>
@@ -11525,7 +11532,7 @@
               </a:ln>
               <a:extLst>
                 <a:ext uri="{91240B29-F687-4f45-9708-019B960494DF}">
-                  <a14:hiddenLine xmlns:a14="http://schemas.microsoft.com/office/drawing/2010/main" xmlns="" w="9525">
+                  <a14:hiddenLine xmlns="" xmlns:a14="http://schemas.microsoft.com/office/drawing/2010/main" w="9525">
                     <a:solidFill>
                       <a:srgbClr val="000000"/>
                     </a:solidFill>
@@ -11593,7 +11600,7 @@
               </a:ln>
               <a:extLst>
                 <a:ext uri="{91240B29-F687-4f45-9708-019B960494DF}">
-                  <a14:hiddenLine xmlns:a14="http://schemas.microsoft.com/office/drawing/2010/main" xmlns="" w="9525">
+                  <a14:hiddenLine xmlns="" xmlns:a14="http://schemas.microsoft.com/office/drawing/2010/main" w="9525">
                     <a:solidFill>
                       <a:srgbClr val="000000"/>
                     </a:solidFill>
@@ -11683,7 +11690,7 @@
               </a:ln>
               <a:extLst>
                 <a:ext uri="{91240B29-F687-4f45-9708-019B960494DF}">
-                  <a14:hiddenLine xmlns:a14="http://schemas.microsoft.com/office/drawing/2010/main" xmlns="" w="9525">
+                  <a14:hiddenLine xmlns="" xmlns:a14="http://schemas.microsoft.com/office/drawing/2010/main" w="9525">
                     <a:solidFill>
                       <a:srgbClr val="000000"/>
                     </a:solidFill>
@@ -11751,7 +11758,7 @@
               </a:ln>
               <a:extLst>
                 <a:ext uri="{91240B29-F687-4f45-9708-019B960494DF}">
-                  <a14:hiddenLine xmlns:a14="http://schemas.microsoft.com/office/drawing/2010/main" xmlns="" w="9525">
+                  <a14:hiddenLine xmlns="" xmlns:a14="http://schemas.microsoft.com/office/drawing/2010/main" w="9525">
                     <a:solidFill>
                       <a:srgbClr val="000000"/>
                     </a:solidFill>
@@ -11841,7 +11848,7 @@
               </a:ln>
               <a:extLst>
                 <a:ext uri="{91240B29-F687-4f45-9708-019B960494DF}">
-                  <a14:hiddenLine xmlns:a14="http://schemas.microsoft.com/office/drawing/2010/main" xmlns="" w="9525">
+                  <a14:hiddenLine xmlns="" xmlns:a14="http://schemas.microsoft.com/office/drawing/2010/main" w="9525">
                     <a:solidFill>
                       <a:srgbClr val="000000"/>
                     </a:solidFill>
@@ -11875,7 +11882,7 @@
               </a:ln>
               <a:extLst>
                 <a:ext uri="{91240B29-F687-4f45-9708-019B960494DF}">
-                  <a14:hiddenLine xmlns:a14="http://schemas.microsoft.com/office/drawing/2010/main" xmlns="" w="9525">
+                  <a14:hiddenLine xmlns="" xmlns:a14="http://schemas.microsoft.com/office/drawing/2010/main" w="9525">
                     <a:solidFill>
                       <a:srgbClr val="000000"/>
                     </a:solidFill>
@@ -12015,7 +12022,7 @@
           <a:p>
             <a:fld id="{EB8BC949-8001-4128-9B2B-8E29415BD44B}" type="datetimeFigureOut">
               <a:rPr lang="es-CL" smtClean="0"/>
-              <a:t>25-01-2019</a:t>
+              <a:t>26-01-2019</a:t>
             </a:fld>
             <a:endParaRPr lang="es-CL"/>
           </a:p>
@@ -12588,44 +12595,51 @@
             <p:ph idx="1"/>
           </p:nvPr>
         </p:nvSpPr>
-        <p:spPr/>
+        <p:spPr>
+          <a:xfrm>
+            <a:off x="1141413" y="2249486"/>
+            <a:ext cx="7021926" cy="3989995"/>
+          </a:xfrm>
+        </p:spPr>
         <p:txBody>
-          <a:bodyPr/>
+          <a:bodyPr>
+            <a:normAutofit/>
+          </a:bodyPr>
           <a:lstStyle/>
           <a:p>
             <a:r>
-              <a:rPr lang="es-CL" dirty="0"/>
+              <a:rPr lang="es-CL" sz="3200" dirty="0"/>
               <a:t>Página web.</a:t>
             </a:r>
           </a:p>
           <a:p>
             <a:r>
-              <a:rPr lang="es-CL" dirty="0"/>
+              <a:rPr lang="es-CL" sz="3200" dirty="0"/>
               <a:t>Herramientas a ocupar:</a:t>
             </a:r>
           </a:p>
           <a:p>
             <a:pPr lvl="1"/>
             <a:r>
-              <a:rPr lang="es-CL" dirty="0"/>
+              <a:rPr lang="es-CL" sz="2800" dirty="0"/>
               <a:t>Programa R.</a:t>
             </a:r>
           </a:p>
           <a:p>
             <a:pPr lvl="1"/>
             <a:r>
-              <a:rPr lang="es-CL" dirty="0" err="1"/>
+              <a:rPr lang="es-CL" sz="2800" dirty="0" err="1"/>
               <a:t>SourceTree</a:t>
             </a:r>
             <a:r>
-              <a:rPr lang="es-CL" dirty="0"/>
+              <a:rPr lang="es-CL" sz="2800" dirty="0"/>
               <a:t>.</a:t>
             </a:r>
           </a:p>
           <a:p>
             <a:pPr lvl="1"/>
             <a:r>
-              <a:rPr lang="es-CL" dirty="0"/>
+              <a:rPr lang="es-CL" sz="2800" dirty="0"/>
               <a:t>GitHub</a:t>
             </a:r>
           </a:p>
@@ -12707,12 +12721,15 @@
         </p:nvSpPr>
         <p:spPr/>
         <p:txBody>
-          <a:bodyPr/>
+          <a:bodyPr>
+            <a:normAutofit/>
+          </a:bodyPr>
           <a:lstStyle/>
           <a:p>
+            <a:pPr algn="ctr"/>
             <a:r>
-              <a:rPr lang="es-CL" dirty="0"/>
-              <a:t>Buscar la manera de anticiparse al riesgo en las transacciones financieras.</a:t>
+              <a:rPr lang="es-CL" sz="3200" dirty="0"/>
+              <a:t>Anticiparse al riesgo en las transacciones financieras a través de un análisis a las noticias de economía.</a:t>
             </a:r>
           </a:p>
         </p:txBody>
@@ -12798,15 +12815,65 @@
           <a:p>
             <a:r>
               <a:rPr lang="es-CL" dirty="0"/>
-              <a:t>Ver archivo “</a:t>
+              <a:t>Inspección a la página “https://www.emol.com/</a:t>
             </a:r>
             <a:r>
               <a:rPr lang="es-CL" dirty="0" err="1"/>
-              <a:t>ExtracionInfoEmol</a:t>
+              <a:t>economia</a:t>
             </a:r>
             <a:r>
               <a:rPr lang="es-CL" dirty="0"/>
-              <a:t>” el cuál está en la plataforma GitHub. </a:t>
+              <a:t>/”  </a:t>
+            </a:r>
+          </a:p>
+          <a:p>
+            <a:r>
+              <a:rPr lang="es-CL" dirty="0"/>
+              <a:t>Reconocimiento de “</a:t>
+            </a:r>
+            <a:r>
+              <a:rPr lang="es-CL" dirty="0" err="1"/>
+              <a:t>div’s</a:t>
+            </a:r>
+            <a:r>
+              <a:rPr lang="es-CL" dirty="0"/>
+              <a:t>”, “clases” y/o “</a:t>
+            </a:r>
+            <a:r>
+              <a:rPr lang="es-CL" dirty="0" err="1"/>
+              <a:t>tag’s</a:t>
+            </a:r>
+            <a:r>
+              <a:rPr lang="es-CL" dirty="0"/>
+              <a:t>” asociados a links de los cuales se extraerá información.</a:t>
+            </a:r>
+          </a:p>
+          <a:p>
+            <a:r>
+              <a:rPr lang="es-CL" dirty="0"/>
+              <a:t>Reconocimiento de “</a:t>
+            </a:r>
+            <a:r>
+              <a:rPr lang="es-CL" dirty="0" err="1"/>
+              <a:t>div’s</a:t>
+            </a:r>
+            <a:r>
+              <a:rPr lang="es-CL" dirty="0"/>
+              <a:t>”, “clases” y/o “</a:t>
+            </a:r>
+            <a:r>
+              <a:rPr lang="es-CL" dirty="0" err="1"/>
+              <a:t>tag’s</a:t>
+            </a:r>
+            <a:r>
+              <a:rPr lang="es-CL" dirty="0"/>
+              <a:t>” que se apliquen de forma similar en las distintas páginas (links) para la extracción del “Titulo”, “Fecha”, “Bajada” y “Cuerpo”.</a:t>
+            </a:r>
+          </a:p>
+          <a:p>
+            <a:r>
+              <a:rPr lang="es-CL" dirty="0"/>
+              <a:t>Se trabaja la extracción de información a través del programa R-Studio</a:t>
             </a:r>
           </a:p>
         </p:txBody>
@@ -12825,6 +12892,72 @@
 </file>
 
 <file path=ppt/slides/slide5.xml><?xml version="1.0" encoding="utf-8"?>
+<p:sld xmlns:a="http://schemas.openxmlformats.org/drawingml/2006/main" xmlns:r="http://schemas.openxmlformats.org/officeDocument/2006/relationships" xmlns:p="http://schemas.openxmlformats.org/presentationml/2006/main">
+  <p:cSld>
+    <p:spTree>
+      <p:nvGrpSpPr>
+        <p:cNvPr id="1" name=""/>
+        <p:cNvGrpSpPr/>
+        <p:nvPr/>
+      </p:nvGrpSpPr>
+      <p:grpSpPr>
+        <a:xfrm>
+          <a:off x="0" y="0"/>
+          <a:ext cx="0" cy="0"/>
+          <a:chOff x="0" y="0"/>
+          <a:chExt cx="0" cy="0"/>
+        </a:xfrm>
+      </p:grpSpPr>
+      <p:pic>
+        <p:nvPicPr>
+          <p:cNvPr id="5" name="Imagen 4">
+            <a:extLst>
+              <a:ext uri="{FF2B5EF4-FFF2-40B4-BE49-F238E27FC236}">
+                <a16:creationId xmlns:a16="http://schemas.microsoft.com/office/drawing/2014/main" id="{649D60DE-8332-4B33-86F7-48B689D53BD0}"/>
+              </a:ext>
+            </a:extLst>
+          </p:cNvPr>
+          <p:cNvPicPr>
+            <a:picLocks noChangeAspect="1"/>
+          </p:cNvPicPr>
+          <p:nvPr/>
+        </p:nvPicPr>
+        <p:blipFill>
+          <a:blip r:embed="rId2">
+            <a:extLst>
+              <a:ext uri="{28A0092B-C50C-407E-A947-70E740481C1C}">
+                <a14:useLocalDpi xmlns:a14="http://schemas.microsoft.com/office/drawing/2010/main" val="0"/>
+              </a:ext>
+            </a:extLst>
+          </a:blip>
+          <a:stretch>
+            <a:fillRect/>
+          </a:stretch>
+        </p:blipFill>
+        <p:spPr>
+          <a:xfrm>
+            <a:off x="0" y="0"/>
+            <a:ext cx="12192000" cy="6857999"/>
+          </a:xfrm>
+          <a:prstGeom prst="rect">
+            <a:avLst/>
+          </a:prstGeom>
+        </p:spPr>
+      </p:pic>
+    </p:spTree>
+    <p:extLst>
+      <p:ext uri="{BB962C8B-B14F-4D97-AF65-F5344CB8AC3E}">
+        <p14:creationId xmlns:p14="http://schemas.microsoft.com/office/powerpoint/2010/main" val="2783531551"/>
+      </p:ext>
+    </p:extLst>
+  </p:cSld>
+  <p:clrMapOvr>
+    <a:masterClrMapping/>
+  </p:clrMapOvr>
+</p:sld>
+</file>
+
+<file path=ppt/slides/slide6.xml><?xml version="1.0" encoding="utf-8"?>
 <p:sld xmlns:a="http://schemas.openxmlformats.org/drawingml/2006/main" xmlns:r="http://schemas.openxmlformats.org/officeDocument/2006/relationships" xmlns:p="http://schemas.openxmlformats.org/presentationml/2006/main">
   <p:cSld>
     <p:spTree>
@@ -12892,14 +13025,32 @@
           <a:p>
             <a:r>
               <a:rPr lang="es-CL" dirty="0"/>
-              <a:t>No se logró el objetivo final.</a:t>
+              <a:t>Inicialmente existieron desafíos en la utilización del programa R-Studio.</a:t>
             </a:r>
           </a:p>
           <a:p>
             <a:r>
               <a:rPr lang="es-CL" dirty="0"/>
-              <a:t>Se obtuvieron otros resultados en modo de prueba.</a:t>
+              <a:t>No se logró el objetivo final en su totalidad.</a:t>
             </a:r>
+          </a:p>
+          <a:p>
+            <a:r>
+              <a:rPr lang="es-CL" dirty="0"/>
+              <a:t>Se obtuvieron resultados en modo de prueba.</a:t>
+            </a:r>
+          </a:p>
+          <a:p>
+            <a:r>
+              <a:rPr lang="es-CL" dirty="0"/>
+              <a:t>Propuestas.</a:t>
+            </a:r>
+          </a:p>
+          <a:p>
+            <a:pPr marL="0" indent="0">
+              <a:buNone/>
+            </a:pPr>
+            <a:endParaRPr lang="es-CL" dirty="0"/>
           </a:p>
         </p:txBody>
       </p:sp>
@@ -12907,6 +13058,72 @@
     <p:extLst>
       <p:ext uri="{BB962C8B-B14F-4D97-AF65-F5344CB8AC3E}">
         <p14:creationId xmlns:p14="http://schemas.microsoft.com/office/powerpoint/2010/main" val="3348667125"/>
+      </p:ext>
+    </p:extLst>
+  </p:cSld>
+  <p:clrMapOvr>
+    <a:masterClrMapping/>
+  </p:clrMapOvr>
+</p:sld>
+</file>
+
+<file path=ppt/slides/slide7.xml><?xml version="1.0" encoding="utf-8"?>
+<p:sld xmlns:a="http://schemas.openxmlformats.org/drawingml/2006/main" xmlns:r="http://schemas.openxmlformats.org/officeDocument/2006/relationships" xmlns:p="http://schemas.openxmlformats.org/presentationml/2006/main">
+  <p:cSld>
+    <p:spTree>
+      <p:nvGrpSpPr>
+        <p:cNvPr id="1" name=""/>
+        <p:cNvGrpSpPr/>
+        <p:nvPr/>
+      </p:nvGrpSpPr>
+      <p:grpSpPr>
+        <a:xfrm>
+          <a:off x="0" y="0"/>
+          <a:ext cx="0" cy="0"/>
+          <a:chOff x="0" y="0"/>
+          <a:chExt cx="0" cy="0"/>
+        </a:xfrm>
+      </p:grpSpPr>
+      <p:sp>
+        <p:nvSpPr>
+          <p:cNvPr id="3" name="Marcador de contenido 2">
+            <a:extLst>
+              <a:ext uri="{FF2B5EF4-FFF2-40B4-BE49-F238E27FC236}">
+                <a16:creationId xmlns:a16="http://schemas.microsoft.com/office/drawing/2014/main" id="{5BEC3FA4-1548-4A5D-B59E-B4E62399F9F0}"/>
+              </a:ext>
+            </a:extLst>
+          </p:cNvPr>
+          <p:cNvSpPr>
+            <a:spLocks noGrp="1"/>
+          </p:cNvSpPr>
+          <p:nvPr>
+            <p:ph idx="1"/>
+          </p:nvPr>
+        </p:nvSpPr>
+        <p:spPr>
+          <a:xfrm>
+            <a:off x="7979534" y="5469765"/>
+            <a:ext cx="2834240" cy="679243"/>
+          </a:xfrm>
+        </p:spPr>
+        <p:txBody>
+          <a:bodyPr/>
+          <a:lstStyle/>
+          <a:p>
+            <a:pPr marL="0" indent="0">
+              <a:buNone/>
+            </a:pPr>
+            <a:r>
+              <a:rPr lang="es-CL" dirty="0"/>
+              <a:t>Muchas Gracias.</a:t>
+            </a:r>
+          </a:p>
+        </p:txBody>
+      </p:sp>
+    </p:spTree>
+    <p:extLst>
+      <p:ext uri="{BB962C8B-B14F-4D97-AF65-F5344CB8AC3E}">
+        <p14:creationId xmlns:p14="http://schemas.microsoft.com/office/powerpoint/2010/main" val="465691437"/>
       </p:ext>
     </p:extLst>
   </p:cSld>

</xml_diff>